<commit_message>
added revised version of second presentation
Uploaded this final version of the presentation to moodle after fixing the database diagram
</commit_message>
<xml_diff>
--- a/Documents&Plans/Presentation2.pptx
+++ b/Documents&Plans/Presentation2.pptx
@@ -9,7 +9,7 @@
     <p:sldId id="258" r:id="rId3"/>
     <p:sldId id="262" r:id="rId4"/>
     <p:sldId id="259" r:id="rId5"/>
-    <p:sldId id="260" r:id="rId6"/>
+    <p:sldId id="264" r:id="rId6"/>
     <p:sldId id="261" r:id="rId7"/>
     <p:sldId id="263" r:id="rId8"/>
   </p:sldIdLst>
@@ -110,6 +110,11 @@
       </a:defRPr>
     </a:lvl9pPr>
   </p:defaultTextStyle>
+  <p:extLst>
+    <p:ext uri="{EFAFB233-063F-42B5-8137-9DF3F51BA10A}">
+      <p15:sldGuideLst xmlns:p15="http://schemas.microsoft.com/office/powerpoint/2012/main"/>
+    </p:ext>
+  </p:extLst>
 </p:presentation>
 </file>
 
@@ -299,7 +304,7 @@
           <a:p>
             <a:fld id="{4AAD347D-5ACD-4C99-B74B-A9C85AD731AF}" type="datetimeFigureOut">
               <a:rPr lang="en-US" dirty="0"/>
-              <a:t>2/19/2016</a:t>
+              <a:t>2/24/2016</a:t>
             </a:fld>
             <a:endParaRPr lang="en-US" dirty="0"/>
           </a:p>
@@ -569,7 +574,7 @@
           <a:p>
             <a:fld id="{4509A250-FF31-4206-8172-F9D3106AACB1}" type="datetimeFigureOut">
               <a:rPr lang="en-US" dirty="0"/>
-              <a:t>2/19/2016</a:t>
+              <a:t>2/24/2016</a:t>
             </a:fld>
             <a:endParaRPr lang="en-US" dirty="0"/>
           </a:p>
@@ -758,7 +763,7 @@
           <a:p>
             <a:fld id="{4509A250-FF31-4206-8172-F9D3106AACB1}" type="datetimeFigureOut">
               <a:rPr lang="en-US" dirty="0"/>
-              <a:t>2/19/2016</a:t>
+              <a:t>2/24/2016</a:t>
             </a:fld>
             <a:endParaRPr lang="en-US" dirty="0"/>
           </a:p>
@@ -1026,7 +1031,7 @@
           <a:p>
             <a:fld id="{4509A250-FF31-4206-8172-F9D3106AACB1}" type="datetimeFigureOut">
               <a:rPr lang="en-US" dirty="0"/>
-              <a:t>2/19/2016</a:t>
+              <a:t>2/24/2016</a:t>
             </a:fld>
             <a:endParaRPr lang="en-US" dirty="0"/>
           </a:p>
@@ -1362,7 +1367,7 @@
           <a:p>
             <a:fld id="{4509A250-FF31-4206-8172-F9D3106AACB1}" type="datetimeFigureOut">
               <a:rPr lang="en-US" dirty="0"/>
-              <a:t>2/19/2016</a:t>
+              <a:t>2/24/2016</a:t>
             </a:fld>
             <a:endParaRPr lang="en-US" dirty="0"/>
           </a:p>
@@ -1980,7 +1985,7 @@
           <a:p>
             <a:fld id="{4509A250-FF31-4206-8172-F9D3106AACB1}" type="datetimeFigureOut">
               <a:rPr lang="en-US" dirty="0"/>
-              <a:t>2/19/2016</a:t>
+              <a:t>2/24/2016</a:t>
             </a:fld>
             <a:endParaRPr lang="en-US" dirty="0"/>
           </a:p>
@@ -2835,7 +2840,7 @@
           <a:p>
             <a:fld id="{4509A250-FF31-4206-8172-F9D3106AACB1}" type="datetimeFigureOut">
               <a:rPr lang="en-US" dirty="0"/>
-              <a:t>2/19/2016</a:t>
+              <a:t>2/24/2016</a:t>
             </a:fld>
             <a:endParaRPr lang="en-US" dirty="0"/>
           </a:p>
@@ -3000,7 +3005,7 @@
           <a:p>
             <a:fld id="{4509A250-FF31-4206-8172-F9D3106AACB1}" type="datetimeFigureOut">
               <a:rPr lang="en-US" dirty="0"/>
-              <a:t>2/19/2016</a:t>
+              <a:t>2/24/2016</a:t>
             </a:fld>
             <a:endParaRPr lang="en-US" dirty="0"/>
           </a:p>
@@ -3175,7 +3180,7 @@
           <a:p>
             <a:fld id="{4509A250-FF31-4206-8172-F9D3106AACB1}" type="datetimeFigureOut">
               <a:rPr lang="en-US" dirty="0"/>
-              <a:t>2/19/2016</a:t>
+              <a:t>2/24/2016</a:t>
             </a:fld>
             <a:endParaRPr lang="en-US" dirty="0"/>
           </a:p>
@@ -3340,7 +3345,7 @@
           <a:p>
             <a:fld id="{4509A250-FF31-4206-8172-F9D3106AACB1}" type="datetimeFigureOut">
               <a:rPr lang="en-US" dirty="0"/>
-              <a:t>2/19/2016</a:t>
+              <a:t>2/24/2016</a:t>
             </a:fld>
             <a:endParaRPr lang="en-US" dirty="0"/>
           </a:p>
@@ -3582,7 +3587,7 @@
           <a:p>
             <a:fld id="{9796027F-7875-4030-9381-8BD8C4F21935}" type="datetimeFigureOut">
               <a:rPr lang="en-US" dirty="0"/>
-              <a:t>2/19/2016</a:t>
+              <a:t>2/24/2016</a:t>
             </a:fld>
             <a:endParaRPr lang="en-US" dirty="0"/>
           </a:p>
@@ -3869,7 +3874,7 @@
           <a:p>
             <a:fld id="{9796027F-7875-4030-9381-8BD8C4F21935}" type="datetimeFigureOut">
               <a:rPr lang="en-US" dirty="0"/>
-              <a:t>2/19/2016</a:t>
+              <a:t>2/24/2016</a:t>
             </a:fld>
             <a:endParaRPr lang="en-US" dirty="0"/>
           </a:p>
@@ -4308,7 +4313,7 @@
           <a:p>
             <a:fld id="{9796027F-7875-4030-9381-8BD8C4F21935}" type="datetimeFigureOut">
               <a:rPr lang="en-US" dirty="0"/>
-              <a:t>2/19/2016</a:t>
+              <a:t>2/24/2016</a:t>
             </a:fld>
             <a:endParaRPr lang="en-US" dirty="0"/>
           </a:p>
@@ -4421,7 +4426,7 @@
           <a:p>
             <a:fld id="{4509A250-FF31-4206-8172-F9D3106AACB1}" type="datetimeFigureOut">
               <a:rPr lang="en-US" dirty="0"/>
-              <a:t>2/19/2016</a:t>
+              <a:t>2/24/2016</a:t>
             </a:fld>
             <a:endParaRPr lang="en-US" dirty="0"/>
           </a:p>
@@ -4511,7 +4516,7 @@
           <a:p>
             <a:fld id="{4509A250-FF31-4206-8172-F9D3106AACB1}" type="datetimeFigureOut">
               <a:rPr lang="en-US" dirty="0"/>
-              <a:t>2/19/2016</a:t>
+              <a:t>2/24/2016</a:t>
             </a:fld>
             <a:endParaRPr lang="en-US" dirty="0"/>
           </a:p>
@@ -4785,7 +4790,7 @@
           <a:p>
             <a:fld id="{4509A250-FF31-4206-8172-F9D3106AACB1}" type="datetimeFigureOut">
               <a:rPr lang="en-US" dirty="0"/>
-              <a:t>2/19/2016</a:t>
+              <a:t>2/24/2016</a:t>
             </a:fld>
             <a:endParaRPr lang="en-US" dirty="0"/>
           </a:p>
@@ -5055,7 +5060,7 @@
           <a:p>
             <a:fld id="{4509A250-FF31-4206-8172-F9D3106AACB1}" type="datetimeFigureOut">
               <a:rPr lang="en-US" dirty="0"/>
-              <a:t>2/19/2016</a:t>
+              <a:t>2/24/2016</a:t>
             </a:fld>
             <a:endParaRPr lang="en-US" dirty="0"/>
           </a:p>
@@ -5479,7 +5484,7 @@
           <a:p>
             <a:fld id="{4AAD347D-5ACD-4C99-B74B-A9C85AD731AF}" type="datetimeFigureOut">
               <a:rPr lang="en-US" dirty="0"/>
-              <a:t>2/19/2016</a:t>
+              <a:t>2/24/2016</a:t>
             </a:fld>
             <a:endParaRPr lang="en-US" dirty="0"/>
           </a:p>
@@ -6447,8 +6452,8 @@
         </p:nvSpPr>
         <p:spPr>
           <a:xfrm>
-            <a:off x="646111" y="452718"/>
-            <a:ext cx="9404723" cy="806915"/>
+            <a:off x="646111" y="123204"/>
+            <a:ext cx="9404723" cy="1400530"/>
           </a:xfrm>
         </p:spPr>
         <p:txBody>
@@ -6458,15 +6463,7 @@
             <a:pPr algn="ctr"/>
             <a:r>
               <a:rPr lang="en-IE" dirty="0" smtClean="0"/>
-              <a:t>Current </a:t>
-            </a:r>
-            <a:r>
-              <a:rPr lang="en-IE" dirty="0"/>
-              <a:t>D</a:t>
-            </a:r>
-            <a:r>
-              <a:rPr lang="en-IE" dirty="0" smtClean="0"/>
-              <a:t>atabase Layout </a:t>
+              <a:t>Current database layout</a:t>
             </a:r>
             <a:endParaRPr lang="en-IE" dirty="0"/>
           </a:p>
@@ -6496,28 +6493,21 @@
         </p:blipFill>
         <p:spPr>
           <a:xfrm>
-            <a:off x="646110" y="1800809"/>
-            <a:ext cx="10835727" cy="4653470"/>
+            <a:off x="361907" y="889687"/>
+            <a:ext cx="10851989" cy="4959202"/>
           </a:xfrm>
         </p:spPr>
       </p:pic>
     </p:spTree>
     <p:extLst>
       <p:ext uri="{BB962C8B-B14F-4D97-AF65-F5344CB8AC3E}">
-        <p14:creationId xmlns:p14="http://schemas.microsoft.com/office/powerpoint/2010/main" val="3633965647"/>
+        <p14:creationId xmlns:p14="http://schemas.microsoft.com/office/powerpoint/2010/main" val="3147397719"/>
       </p:ext>
     </p:extLst>
   </p:cSld>
   <p:clrMapOvr>
     <a:masterClrMapping/>
   </p:clrMapOvr>
-  <p:timing>
-    <p:tnLst>
-      <p:par>
-        <p:cTn id="1" dur="indefinite" restart="never" nodeType="tmRoot"/>
-      </p:par>
-    </p:tnLst>
-  </p:timing>
 </p:sld>
 </file>
 

</xml_diff>